<commit_message>
adding outlines first version of figures
</commit_message>
<xml_diff>
--- a/Figure.Ideas.pptx
+++ b/Figure.Ideas.pptx
@@ -5,15 +5,17 @@
     <p:sldMasterId id="2147483648" r:id="rId1"/>
   </p:sldMasterIdLst>
   <p:notesMasterIdLst>
-    <p:notesMasterId r:id="rId8"/>
+    <p:notesMasterId r:id="rId10"/>
   </p:notesMasterIdLst>
   <p:sldIdLst>
     <p:sldId id="257" r:id="rId2"/>
     <p:sldId id="260" r:id="rId3"/>
     <p:sldId id="258" r:id="rId4"/>
-    <p:sldId id="259" r:id="rId5"/>
-    <p:sldId id="261" r:id="rId6"/>
-    <p:sldId id="256" r:id="rId7"/>
+    <p:sldId id="261" r:id="rId5"/>
+    <p:sldId id="256" r:id="rId6"/>
+    <p:sldId id="259" r:id="rId7"/>
+    <p:sldId id="262" r:id="rId8"/>
+    <p:sldId id="263" r:id="rId9"/>
   </p:sldIdLst>
   <p:sldSz cx="12192000" cy="6858000"/>
   <p:notesSz cx="6858000" cy="9144000"/>
@@ -213,7 +215,7 @@
           <a:p>
             <a:fld id="{E5748B63-5BB5-407E-80AF-8E86B5EDE4BB}" type="datetimeFigureOut">
               <a:rPr lang="en-US" smtClean="0"/>
-              <a:t>4/8/2020</a:t>
+              <a:t>4/9/2020</a:t>
             </a:fld>
             <a:endParaRPr lang="en-US"/>
           </a:p>
@@ -718,7 +720,7 @@
           <a:p>
             <a:fld id="{D836B551-2E43-4FFE-9FE2-782B1B7A4E04}" type="slidenum">
               <a:rPr lang="en-US" smtClean="0"/>
-              <a:t>5</a:t>
+              <a:t>4</a:t>
             </a:fld>
             <a:endParaRPr lang="en-US"/>
           </a:p>
@@ -885,7 +887,7 @@
           <a:p>
             <a:fld id="{D836B551-2E43-4FFE-9FE2-782B1B7A4E04}" type="slidenum">
               <a:rPr lang="en-US" smtClean="0"/>
-              <a:t>6</a:t>
+              <a:t>5</a:t>
             </a:fld>
             <a:endParaRPr lang="en-US"/>
           </a:p>
@@ -895,6 +897,90 @@
     <p:extLst>
       <p:ext uri="{BB962C8B-B14F-4D97-AF65-F5344CB8AC3E}">
         <p14:creationId xmlns:p14="http://schemas.microsoft.com/office/powerpoint/2010/main" val="2307529238"/>
+      </p:ext>
+    </p:extLst>
+  </p:cSld>
+  <p:clrMapOvr>
+    <a:masterClrMapping/>
+  </p:clrMapOvr>
+</p:notes>
+</file>
+
+<file path=ppt/notesSlides/notesSlide5.xml><?xml version="1.0" encoding="utf-8"?>
+<p:notes xmlns:a="http://schemas.openxmlformats.org/drawingml/2006/main" xmlns:r="http://schemas.openxmlformats.org/officeDocument/2006/relationships" xmlns:p="http://schemas.openxmlformats.org/presentationml/2006/main">
+  <p:cSld>
+    <p:spTree>
+      <p:nvGrpSpPr>
+        <p:cNvPr id="1" name=""/>
+        <p:cNvGrpSpPr/>
+        <p:nvPr/>
+      </p:nvGrpSpPr>
+      <p:grpSpPr>
+        <a:xfrm>
+          <a:off x="0" y="0"/>
+          <a:ext cx="0" cy="0"/>
+          <a:chOff x="0" y="0"/>
+          <a:chExt cx="0" cy="0"/>
+        </a:xfrm>
+      </p:grpSpPr>
+      <p:sp>
+        <p:nvSpPr>
+          <p:cNvPr id="2" name="Slide Image Placeholder 1"/>
+          <p:cNvSpPr>
+            <a:spLocks noGrp="1" noRot="1" noChangeAspect="1"/>
+          </p:cNvSpPr>
+          <p:nvPr>
+            <p:ph type="sldImg"/>
+          </p:nvPr>
+        </p:nvSpPr>
+        <p:spPr/>
+      </p:sp>
+      <p:sp>
+        <p:nvSpPr>
+          <p:cNvPr id="3" name="Notes Placeholder 2"/>
+          <p:cNvSpPr>
+            <a:spLocks noGrp="1"/>
+          </p:cNvSpPr>
+          <p:nvPr>
+            <p:ph type="body" idx="1"/>
+          </p:nvPr>
+        </p:nvSpPr>
+        <p:spPr/>
+        <p:txBody>
+          <a:bodyPr/>
+          <a:lstStyle/>
+          <a:p>
+            <a:endParaRPr lang="en-US"/>
+          </a:p>
+        </p:txBody>
+      </p:sp>
+      <p:sp>
+        <p:nvSpPr>
+          <p:cNvPr id="4" name="Slide Number Placeholder 3"/>
+          <p:cNvSpPr>
+            <a:spLocks noGrp="1"/>
+          </p:cNvSpPr>
+          <p:nvPr>
+            <p:ph type="sldNum" sz="quarter" idx="10"/>
+          </p:nvPr>
+        </p:nvSpPr>
+        <p:spPr/>
+        <p:txBody>
+          <a:bodyPr/>
+          <a:lstStyle/>
+          <a:p>
+            <a:fld id="{D836B551-2E43-4FFE-9FE2-782B1B7A4E04}" type="slidenum">
+              <a:rPr lang="en-US" smtClean="0"/>
+              <a:t>8</a:t>
+            </a:fld>
+            <a:endParaRPr lang="en-US"/>
+          </a:p>
+        </p:txBody>
+      </p:sp>
+    </p:spTree>
+    <p:extLst>
+      <p:ext uri="{BB962C8B-B14F-4D97-AF65-F5344CB8AC3E}">
+        <p14:creationId xmlns:p14="http://schemas.microsoft.com/office/powerpoint/2010/main" val="137419189"/>
       </p:ext>
     </p:extLst>
   </p:cSld>
@@ -1035,7 +1121,7 @@
           <a:p>
             <a:fld id="{03681C2C-16DA-40AA-A93A-93C542D4C8DB}" type="datetimeFigureOut">
               <a:rPr lang="en-US" smtClean="0"/>
-              <a:t>4/8/2020</a:t>
+              <a:t>4/9/2020</a:t>
             </a:fld>
             <a:endParaRPr lang="en-US"/>
           </a:p>
@@ -1205,7 +1291,7 @@
           <a:p>
             <a:fld id="{03681C2C-16DA-40AA-A93A-93C542D4C8DB}" type="datetimeFigureOut">
               <a:rPr lang="en-US" smtClean="0"/>
-              <a:t>4/8/2020</a:t>
+              <a:t>4/9/2020</a:t>
             </a:fld>
             <a:endParaRPr lang="en-US"/>
           </a:p>
@@ -1385,7 +1471,7 @@
           <a:p>
             <a:fld id="{03681C2C-16DA-40AA-A93A-93C542D4C8DB}" type="datetimeFigureOut">
               <a:rPr lang="en-US" smtClean="0"/>
-              <a:t>4/8/2020</a:t>
+              <a:t>4/9/2020</a:t>
             </a:fld>
             <a:endParaRPr lang="en-US"/>
           </a:p>
@@ -1555,7 +1641,7 @@
           <a:p>
             <a:fld id="{03681C2C-16DA-40AA-A93A-93C542D4C8DB}" type="datetimeFigureOut">
               <a:rPr lang="en-US" smtClean="0"/>
-              <a:t>4/8/2020</a:t>
+              <a:t>4/9/2020</a:t>
             </a:fld>
             <a:endParaRPr lang="en-US"/>
           </a:p>
@@ -1801,7 +1887,7 @@
           <a:p>
             <a:fld id="{03681C2C-16DA-40AA-A93A-93C542D4C8DB}" type="datetimeFigureOut">
               <a:rPr lang="en-US" smtClean="0"/>
-              <a:t>4/8/2020</a:t>
+              <a:t>4/9/2020</a:t>
             </a:fld>
             <a:endParaRPr lang="en-US"/>
           </a:p>
@@ -2033,7 +2119,7 @@
           <a:p>
             <a:fld id="{03681C2C-16DA-40AA-A93A-93C542D4C8DB}" type="datetimeFigureOut">
               <a:rPr lang="en-US" smtClean="0"/>
-              <a:t>4/8/2020</a:t>
+              <a:t>4/9/2020</a:t>
             </a:fld>
             <a:endParaRPr lang="en-US"/>
           </a:p>
@@ -2400,7 +2486,7 @@
           <a:p>
             <a:fld id="{03681C2C-16DA-40AA-A93A-93C542D4C8DB}" type="datetimeFigureOut">
               <a:rPr lang="en-US" smtClean="0"/>
-              <a:t>4/8/2020</a:t>
+              <a:t>4/9/2020</a:t>
             </a:fld>
             <a:endParaRPr lang="en-US"/>
           </a:p>
@@ -2518,7 +2604,7 @@
           <a:p>
             <a:fld id="{03681C2C-16DA-40AA-A93A-93C542D4C8DB}" type="datetimeFigureOut">
               <a:rPr lang="en-US" smtClean="0"/>
-              <a:t>4/8/2020</a:t>
+              <a:t>4/9/2020</a:t>
             </a:fld>
             <a:endParaRPr lang="en-US"/>
           </a:p>
@@ -2613,7 +2699,7 @@
           <a:p>
             <a:fld id="{03681C2C-16DA-40AA-A93A-93C542D4C8DB}" type="datetimeFigureOut">
               <a:rPr lang="en-US" smtClean="0"/>
-              <a:t>4/8/2020</a:t>
+              <a:t>4/9/2020</a:t>
             </a:fld>
             <a:endParaRPr lang="en-US"/>
           </a:p>
@@ -2890,7 +2976,7 @@
           <a:p>
             <a:fld id="{03681C2C-16DA-40AA-A93A-93C542D4C8DB}" type="datetimeFigureOut">
               <a:rPr lang="en-US" smtClean="0"/>
-              <a:t>4/8/2020</a:t>
+              <a:t>4/9/2020</a:t>
             </a:fld>
             <a:endParaRPr lang="en-US"/>
           </a:p>
@@ -3143,7 +3229,7 @@
           <a:p>
             <a:fld id="{03681C2C-16DA-40AA-A93A-93C542D4C8DB}" type="datetimeFigureOut">
               <a:rPr lang="en-US" smtClean="0"/>
-              <a:t>4/8/2020</a:t>
+              <a:t>4/9/2020</a:t>
             </a:fld>
             <a:endParaRPr lang="en-US"/>
           </a:p>
@@ -3356,7 +3442,7 @@
           <a:p>
             <a:fld id="{03681C2C-16DA-40AA-A93A-93C542D4C8DB}" type="datetimeFigureOut">
               <a:rPr lang="en-US" smtClean="0"/>
-              <a:t>4/8/2020</a:t>
+              <a:t>4/9/2020</a:t>
             </a:fld>
             <a:endParaRPr lang="en-US"/>
           </a:p>
@@ -3794,15 +3880,48 @@
             <p:ph idx="1"/>
           </p:nvPr>
         </p:nvSpPr>
-        <p:spPr/>
-        <p:txBody>
-          <a:bodyPr/>
-          <a:lstStyle/>
-          <a:p>
-            <a:endParaRPr lang="en-US"/>
-          </a:p>
-        </p:txBody>
-      </p:sp>
+        <p:spPr>
+          <a:xfrm>
+            <a:off x="7493620" y="1825625"/>
+            <a:ext cx="3860180" cy="4351338"/>
+          </a:xfrm>
+        </p:spPr>
+        <p:txBody>
+          <a:bodyPr/>
+          <a:lstStyle/>
+          <a:p>
+            <a:endParaRPr lang="en-US" dirty="0"/>
+          </a:p>
+        </p:txBody>
+      </p:sp>
+      <p:pic>
+        <p:nvPicPr>
+          <p:cNvPr id="4" name="Picture"/>
+          <p:cNvPicPr/>
+          <p:nvPr/>
+        </p:nvPicPr>
+        <p:blipFill>
+          <a:blip r:embed="rId3"/>
+          <a:stretch>
+            <a:fillRect/>
+          </a:stretch>
+        </p:blipFill>
+        <p:spPr bwMode="auto">
+          <a:xfrm>
+            <a:off x="838200" y="1581150"/>
+            <a:ext cx="4619625" cy="3695700"/>
+          </a:xfrm>
+          <a:prstGeom prst="rect">
+            <a:avLst/>
+          </a:prstGeom>
+          <a:noFill/>
+          <a:ln w="9525">
+            <a:noFill/>
+            <a:headEnd/>
+            <a:tailEnd/>
+          </a:ln>
+        </p:spPr>
+      </p:pic>
     </p:spTree>
     <p:extLst>
       <p:ext uri="{BB962C8B-B14F-4D97-AF65-F5344CB8AC3E}">
@@ -3866,15 +3985,48 @@
             <p:ph idx="1"/>
           </p:nvPr>
         </p:nvSpPr>
-        <p:spPr/>
-        <p:txBody>
-          <a:bodyPr/>
-          <a:lstStyle/>
-          <a:p>
-            <a:endParaRPr lang="en-US"/>
-          </a:p>
-        </p:txBody>
-      </p:sp>
+        <p:spPr>
+          <a:xfrm>
+            <a:off x="7984272" y="1825625"/>
+            <a:ext cx="3369527" cy="4351338"/>
+          </a:xfrm>
+        </p:spPr>
+        <p:txBody>
+          <a:bodyPr/>
+          <a:lstStyle/>
+          <a:p>
+            <a:endParaRPr lang="en-US" dirty="0"/>
+          </a:p>
+        </p:txBody>
+      </p:sp>
+      <p:pic>
+        <p:nvPicPr>
+          <p:cNvPr id="4" name="Picture"/>
+          <p:cNvPicPr/>
+          <p:nvPr/>
+        </p:nvPicPr>
+        <p:blipFill>
+          <a:blip r:embed="rId2"/>
+          <a:stretch>
+            <a:fillRect/>
+          </a:stretch>
+        </p:blipFill>
+        <p:spPr bwMode="auto">
+          <a:xfrm>
+            <a:off x="838200" y="1690688"/>
+            <a:ext cx="4619625" cy="3695700"/>
+          </a:xfrm>
+          <a:prstGeom prst="rect">
+            <a:avLst/>
+          </a:prstGeom>
+          <a:noFill/>
+          <a:ln w="9525">
+            <a:noFill/>
+            <a:headEnd/>
+            <a:tailEnd/>
+          </a:ln>
+        </p:spPr>
+      </p:pic>
     </p:spTree>
     <p:extLst>
       <p:ext uri="{BB962C8B-B14F-4D97-AF65-F5344CB8AC3E}">
@@ -3938,15 +4090,48 @@
             <p:ph idx="1"/>
           </p:nvPr>
         </p:nvSpPr>
-        <p:spPr/>
-        <p:txBody>
-          <a:bodyPr/>
-          <a:lstStyle/>
-          <a:p>
-            <a:endParaRPr lang="en-US"/>
-          </a:p>
-        </p:txBody>
-      </p:sp>
+        <p:spPr>
+          <a:xfrm>
+            <a:off x="6490010" y="1825625"/>
+            <a:ext cx="4863790" cy="4351338"/>
+          </a:xfrm>
+        </p:spPr>
+        <p:txBody>
+          <a:bodyPr/>
+          <a:lstStyle/>
+          <a:p>
+            <a:endParaRPr lang="en-US"/>
+          </a:p>
+        </p:txBody>
+      </p:sp>
+      <p:pic>
+        <p:nvPicPr>
+          <p:cNvPr id="4" name="Picture"/>
+          <p:cNvPicPr/>
+          <p:nvPr/>
+        </p:nvPicPr>
+        <p:blipFill>
+          <a:blip r:embed="rId3"/>
+          <a:stretch>
+            <a:fillRect/>
+          </a:stretch>
+        </p:blipFill>
+        <p:spPr bwMode="auto">
+          <a:xfrm>
+            <a:off x="619240" y="2481263"/>
+            <a:ext cx="4619625" cy="3695700"/>
+          </a:xfrm>
+          <a:prstGeom prst="rect">
+            <a:avLst/>
+          </a:prstGeom>
+          <a:noFill/>
+          <a:ln w="9525">
+            <a:noFill/>
+            <a:headEnd/>
+            <a:tailEnd/>
+          </a:ln>
+        </p:spPr>
+      </p:pic>
     </p:spTree>
     <p:extLst>
       <p:ext uri="{BB962C8B-B14F-4D97-AF65-F5344CB8AC3E}">
@@ -3994,78 +4179,6 @@
           <a:p>
             <a:r>
               <a:rPr lang="en-US" dirty="0" smtClean="0"/>
-              <a:t>SC length (by chromosome class)</a:t>
-            </a:r>
-            <a:endParaRPr lang="en-US" dirty="0"/>
-          </a:p>
-        </p:txBody>
-      </p:sp>
-      <p:sp>
-        <p:nvSpPr>
-          <p:cNvPr id="3" name="Content Placeholder 2"/>
-          <p:cNvSpPr>
-            <a:spLocks noGrp="1"/>
-          </p:cNvSpPr>
-          <p:nvPr>
-            <p:ph idx="1"/>
-          </p:nvPr>
-        </p:nvSpPr>
-        <p:spPr/>
-        <p:txBody>
-          <a:bodyPr/>
-          <a:lstStyle/>
-          <a:p>
-            <a:endParaRPr lang="en-US"/>
-          </a:p>
-        </p:txBody>
-      </p:sp>
-    </p:spTree>
-    <p:extLst>
-      <p:ext uri="{BB962C8B-B14F-4D97-AF65-F5344CB8AC3E}">
-        <p14:creationId xmlns:p14="http://schemas.microsoft.com/office/powerpoint/2010/main" val="1925670534"/>
-      </p:ext>
-    </p:extLst>
-  </p:cSld>
-  <p:clrMapOvr>
-    <a:masterClrMapping/>
-  </p:clrMapOvr>
-</p:sld>
-</file>
-
-<file path=ppt/slides/slide5.xml><?xml version="1.0" encoding="utf-8"?>
-<p:sld xmlns:a="http://schemas.openxmlformats.org/drawingml/2006/main" xmlns:r="http://schemas.openxmlformats.org/officeDocument/2006/relationships" xmlns:p="http://schemas.openxmlformats.org/presentationml/2006/main">
-  <p:cSld>
-    <p:spTree>
-      <p:nvGrpSpPr>
-        <p:cNvPr id="1" name=""/>
-        <p:cNvGrpSpPr/>
-        <p:nvPr/>
-      </p:nvGrpSpPr>
-      <p:grpSpPr>
-        <a:xfrm>
-          <a:off x="0" y="0"/>
-          <a:ext cx="0" cy="0"/>
-          <a:chOff x="0" y="0"/>
-          <a:chExt cx="0" cy="0"/>
-        </a:xfrm>
-      </p:grpSpPr>
-      <p:sp>
-        <p:nvSpPr>
-          <p:cNvPr id="2" name="Title 1"/>
-          <p:cNvSpPr>
-            <a:spLocks noGrp="1"/>
-          </p:cNvSpPr>
-          <p:nvPr>
-            <p:ph type="title"/>
-          </p:nvPr>
-        </p:nvSpPr>
-        <p:spPr/>
-        <p:txBody>
-          <a:bodyPr/>
-          <a:lstStyle/>
-          <a:p>
-            <a:r>
-              <a:rPr lang="en-US" dirty="0" smtClean="0"/>
               <a:t>Position (1CO)</a:t>
             </a:r>
             <a:endParaRPr lang="en-US" dirty="0"/>
@@ -4104,7 +4217,7 @@
 </p:sld>
 </file>
 
-<file path=ppt/slides/slide6.xml><?xml version="1.0" encoding="utf-8"?>
+<file path=ppt/slides/slide5.xml><?xml version="1.0" encoding="utf-8"?>
 <p:sld xmlns:a="http://schemas.openxmlformats.org/drawingml/2006/main" xmlns:r="http://schemas.openxmlformats.org/officeDocument/2006/relationships" xmlns:p="http://schemas.openxmlformats.org/presentationml/2006/main">
   <p:cSld>
     <p:spTree>
@@ -4784,6 +4897,340 @@
       </p:par>
     </p:tnLst>
   </p:timing>
+</p:sld>
+</file>
+
+<file path=ppt/slides/slide6.xml><?xml version="1.0" encoding="utf-8"?>
+<p:sld xmlns:a="http://schemas.openxmlformats.org/drawingml/2006/main" xmlns:r="http://schemas.openxmlformats.org/officeDocument/2006/relationships" xmlns:p="http://schemas.openxmlformats.org/presentationml/2006/main">
+  <p:cSld>
+    <p:spTree>
+      <p:nvGrpSpPr>
+        <p:cNvPr id="1" name=""/>
+        <p:cNvGrpSpPr/>
+        <p:nvPr/>
+      </p:nvGrpSpPr>
+      <p:grpSpPr>
+        <a:xfrm>
+          <a:off x="0" y="0"/>
+          <a:ext cx="0" cy="0"/>
+          <a:chOff x="0" y="0"/>
+          <a:chExt cx="0" cy="0"/>
+        </a:xfrm>
+      </p:grpSpPr>
+      <p:sp>
+        <p:nvSpPr>
+          <p:cNvPr id="2" name="Title 1"/>
+          <p:cNvSpPr>
+            <a:spLocks noGrp="1"/>
+          </p:cNvSpPr>
+          <p:nvPr>
+            <p:ph type="title"/>
+          </p:nvPr>
+        </p:nvSpPr>
+        <p:spPr/>
+        <p:txBody>
+          <a:bodyPr/>
+          <a:lstStyle/>
+          <a:p>
+            <a:r>
+              <a:rPr lang="en-US" dirty="0" smtClean="0"/>
+              <a:t>SC length (by chromosome class)</a:t>
+            </a:r>
+            <a:endParaRPr lang="en-US" dirty="0"/>
+          </a:p>
+        </p:txBody>
+      </p:sp>
+      <p:sp>
+        <p:nvSpPr>
+          <p:cNvPr id="3" name="Content Placeholder 2"/>
+          <p:cNvSpPr>
+            <a:spLocks noGrp="1"/>
+          </p:cNvSpPr>
+          <p:nvPr>
+            <p:ph idx="1"/>
+          </p:nvPr>
+        </p:nvSpPr>
+        <p:spPr>
+          <a:xfrm>
+            <a:off x="7069872" y="1825625"/>
+            <a:ext cx="4283927" cy="4351338"/>
+          </a:xfrm>
+        </p:spPr>
+        <p:txBody>
+          <a:bodyPr/>
+          <a:lstStyle/>
+          <a:p>
+            <a:endParaRPr lang="en-US" dirty="0"/>
+          </a:p>
+        </p:txBody>
+      </p:sp>
+      <p:pic>
+        <p:nvPicPr>
+          <p:cNvPr id="4" name="Picture"/>
+          <p:cNvPicPr/>
+          <p:nvPr/>
+        </p:nvPicPr>
+        <p:blipFill>
+          <a:blip r:embed="rId2"/>
+          <a:stretch>
+            <a:fillRect/>
+          </a:stretch>
+        </p:blipFill>
+        <p:spPr bwMode="auto">
+          <a:xfrm>
+            <a:off x="838200" y="1685112"/>
+            <a:ext cx="4619625" cy="3695700"/>
+          </a:xfrm>
+          <a:prstGeom prst="rect">
+            <a:avLst/>
+          </a:prstGeom>
+          <a:noFill/>
+          <a:ln w="9525">
+            <a:noFill/>
+            <a:headEnd/>
+            <a:tailEnd/>
+          </a:ln>
+        </p:spPr>
+      </p:pic>
+      <p:pic>
+        <p:nvPicPr>
+          <p:cNvPr id="5" name="Picture"/>
+          <p:cNvPicPr/>
+          <p:nvPr/>
+        </p:nvPicPr>
+        <p:blipFill>
+          <a:blip r:embed="rId3"/>
+          <a:stretch>
+            <a:fillRect/>
+          </a:stretch>
+        </p:blipFill>
+        <p:spPr bwMode="auto">
+          <a:xfrm>
+            <a:off x="6484782" y="1685112"/>
+            <a:ext cx="4619625" cy="3695700"/>
+          </a:xfrm>
+          <a:prstGeom prst="rect">
+            <a:avLst/>
+          </a:prstGeom>
+          <a:noFill/>
+          <a:ln w="9525">
+            <a:noFill/>
+            <a:headEnd/>
+            <a:tailEnd/>
+          </a:ln>
+        </p:spPr>
+      </p:pic>
+    </p:spTree>
+    <p:extLst>
+      <p:ext uri="{BB962C8B-B14F-4D97-AF65-F5344CB8AC3E}">
+        <p14:creationId xmlns:p14="http://schemas.microsoft.com/office/powerpoint/2010/main" val="1925670534"/>
+      </p:ext>
+    </p:extLst>
+  </p:cSld>
+  <p:clrMapOvr>
+    <a:masterClrMapping/>
+  </p:clrMapOvr>
+</p:sld>
+</file>
+
+<file path=ppt/slides/slide7.xml><?xml version="1.0" encoding="utf-8"?>
+<p:sld xmlns:a="http://schemas.openxmlformats.org/drawingml/2006/main" xmlns:r="http://schemas.openxmlformats.org/officeDocument/2006/relationships" xmlns:p="http://schemas.openxmlformats.org/presentationml/2006/main">
+  <p:cSld>
+    <p:spTree>
+      <p:nvGrpSpPr>
+        <p:cNvPr id="1" name=""/>
+        <p:cNvGrpSpPr/>
+        <p:nvPr/>
+      </p:nvGrpSpPr>
+      <p:grpSpPr>
+        <a:xfrm>
+          <a:off x="0" y="0"/>
+          <a:ext cx="0" cy="0"/>
+          <a:chOff x="0" y="0"/>
+          <a:chExt cx="0" cy="0"/>
+        </a:xfrm>
+      </p:grpSpPr>
+      <p:sp>
+        <p:nvSpPr>
+          <p:cNvPr id="2" name="Title 1"/>
+          <p:cNvSpPr>
+            <a:spLocks noGrp="1"/>
+          </p:cNvSpPr>
+          <p:nvPr>
+            <p:ph type="title"/>
+          </p:nvPr>
+        </p:nvSpPr>
+        <p:spPr/>
+        <p:txBody>
+          <a:bodyPr/>
+          <a:lstStyle/>
+          <a:p>
+            <a:endParaRPr lang="en-US"/>
+          </a:p>
+        </p:txBody>
+      </p:sp>
+      <p:sp>
+        <p:nvSpPr>
+          <p:cNvPr id="3" name="Content Placeholder 2"/>
+          <p:cNvSpPr>
+            <a:spLocks noGrp="1"/>
+          </p:cNvSpPr>
+          <p:nvPr>
+            <p:ph idx="1"/>
+          </p:nvPr>
+        </p:nvSpPr>
+        <p:spPr/>
+        <p:txBody>
+          <a:bodyPr/>
+          <a:lstStyle/>
+          <a:p>
+            <a:endParaRPr lang="en-US"/>
+          </a:p>
+        </p:txBody>
+      </p:sp>
+    </p:spTree>
+    <p:extLst>
+      <p:ext uri="{BB962C8B-B14F-4D97-AF65-F5344CB8AC3E}">
+        <p14:creationId xmlns:p14="http://schemas.microsoft.com/office/powerpoint/2010/main" val="1665848511"/>
+      </p:ext>
+    </p:extLst>
+  </p:cSld>
+  <p:clrMapOvr>
+    <a:masterClrMapping/>
+  </p:clrMapOvr>
+</p:sld>
+</file>
+
+<file path=ppt/slides/slide8.xml><?xml version="1.0" encoding="utf-8"?>
+<p:sld xmlns:a="http://schemas.openxmlformats.org/drawingml/2006/main" xmlns:r="http://schemas.openxmlformats.org/officeDocument/2006/relationships" xmlns:p="http://schemas.openxmlformats.org/presentationml/2006/main">
+  <p:cSld>
+    <p:spTree>
+      <p:nvGrpSpPr>
+        <p:cNvPr id="1" name=""/>
+        <p:cNvGrpSpPr/>
+        <p:nvPr/>
+      </p:nvGrpSpPr>
+      <p:grpSpPr>
+        <a:xfrm>
+          <a:off x="0" y="0"/>
+          <a:ext cx="0" cy="0"/>
+          <a:chOff x="0" y="0"/>
+          <a:chExt cx="0" cy="0"/>
+        </a:xfrm>
+      </p:grpSpPr>
+      <p:sp>
+        <p:nvSpPr>
+          <p:cNvPr id="2" name="Title 1"/>
+          <p:cNvSpPr>
+            <a:spLocks noGrp="1"/>
+          </p:cNvSpPr>
+          <p:nvPr>
+            <p:ph type="title"/>
+          </p:nvPr>
+        </p:nvSpPr>
+        <p:spPr/>
+        <p:txBody>
+          <a:bodyPr/>
+          <a:lstStyle/>
+          <a:p>
+            <a:r>
+              <a:rPr lang="en-US" dirty="0" smtClean="0"/>
+              <a:t>Q2 SC differences</a:t>
+            </a:r>
+            <a:endParaRPr lang="en-US" dirty="0"/>
+          </a:p>
+        </p:txBody>
+      </p:sp>
+      <p:sp>
+        <p:nvSpPr>
+          <p:cNvPr id="3" name="Content Placeholder 2"/>
+          <p:cNvSpPr>
+            <a:spLocks noGrp="1"/>
+          </p:cNvSpPr>
+          <p:nvPr>
+            <p:ph idx="1"/>
+          </p:nvPr>
+        </p:nvSpPr>
+        <p:spPr>
+          <a:xfrm>
+            <a:off x="5754028" y="1825625"/>
+            <a:ext cx="5599771" cy="4351338"/>
+          </a:xfrm>
+        </p:spPr>
+        <p:txBody>
+          <a:bodyPr/>
+          <a:lstStyle/>
+          <a:p>
+            <a:endParaRPr lang="en-US" dirty="0"/>
+          </a:p>
+        </p:txBody>
+      </p:sp>
+      <p:pic>
+        <p:nvPicPr>
+          <p:cNvPr id="4" name="Picture"/>
+          <p:cNvPicPr/>
+          <p:nvPr/>
+        </p:nvPicPr>
+        <p:blipFill>
+          <a:blip r:embed="rId3"/>
+          <a:stretch>
+            <a:fillRect/>
+          </a:stretch>
+        </p:blipFill>
+        <p:spPr bwMode="auto">
+          <a:xfrm>
+            <a:off x="641543" y="2696272"/>
+            <a:ext cx="4619625" cy="3695700"/>
+          </a:xfrm>
+          <a:prstGeom prst="rect">
+            <a:avLst/>
+          </a:prstGeom>
+          <a:noFill/>
+          <a:ln w="9525">
+            <a:noFill/>
+            <a:headEnd/>
+            <a:tailEnd/>
+          </a:ln>
+        </p:spPr>
+      </p:pic>
+      <p:pic>
+        <p:nvPicPr>
+          <p:cNvPr id="5" name="Picture"/>
+          <p:cNvPicPr/>
+          <p:nvPr/>
+        </p:nvPicPr>
+        <p:blipFill>
+          <a:blip r:embed="rId4"/>
+          <a:stretch>
+            <a:fillRect/>
+          </a:stretch>
+        </p:blipFill>
+        <p:spPr bwMode="auto">
+          <a:xfrm>
+            <a:off x="5481173" y="2481263"/>
+            <a:ext cx="4619625" cy="3695700"/>
+          </a:xfrm>
+          <a:prstGeom prst="rect">
+            <a:avLst/>
+          </a:prstGeom>
+          <a:noFill/>
+          <a:ln w="9525">
+            <a:noFill/>
+            <a:headEnd/>
+            <a:tailEnd/>
+          </a:ln>
+        </p:spPr>
+      </p:pic>
+    </p:spTree>
+    <p:extLst>
+      <p:ext uri="{BB962C8B-B14F-4D97-AF65-F5344CB8AC3E}">
+        <p14:creationId xmlns:p14="http://schemas.microsoft.com/office/powerpoint/2010/main" val="3221939421"/>
+      </p:ext>
+    </p:extLst>
+  </p:cSld>
+  <p:clrMapOvr>
+    <a:masterClrMapping/>
+  </p:clrMapOvr>
 </p:sld>
 </file>
 

</xml_diff>